<commit_message>
Adding PDF, pdf newsletter template
I'm using PPT as a template for creating PDF newsletter. Layouts are
just much easier in PPT. :)
</commit_message>
<xml_diff>
--- a/docs/journal/ImpactHowardJournal.pptx
+++ b/docs/journal/ImpactHowardJournal.pptx
@@ -3236,11 +3236,6 @@
               </a:rPr>
               <a:t>Up to this month, a lot has been happening. We no longer consider our chapter another Bible study on campus. There are plenty already at Howard (like dozens). We are now a Biblical Leadership Development ministry focused on addressing life challenges with the Gospel. Our campus ministry evolves from Daniel 1:17-19.</a:t>
             </a:r>
-            <a:endParaRPr lang="en-US" sz="1200" dirty="0" smtClean="0">
-              <a:solidFill>
-                <a:srgbClr val="002060"/>
-              </a:solidFill>
-            </a:endParaRPr>
           </a:p>
         </p:txBody>
       </p:sp>
@@ -3373,63 +3368,15 @@
                   <a:schemeClr val="bg1"/>
                 </a:solidFill>
               </a:rPr>
-              <a:t>Hope</a:t>
-            </a:r>
-            <a:r>
-              <a:rPr lang="en-US" sz="1200" u="sng" dirty="0" smtClean="0">
+              <a:t>Hope of the School Year:</a:t>
+            </a:r>
+            <a:r>
+              <a:rPr lang="en-US" sz="1200" dirty="0" smtClean="0">
                 <a:solidFill>
                   <a:schemeClr val="bg1"/>
                 </a:solidFill>
               </a:rPr>
-              <a:t> </a:t>
-            </a:r>
-            <a:r>
-              <a:rPr lang="en-US" sz="1200" u="sng" dirty="0" smtClean="0">
-                <a:solidFill>
-                  <a:schemeClr val="bg1"/>
-                </a:solidFill>
-              </a:rPr>
-              <a:t>of the </a:t>
-            </a:r>
-            <a:r>
-              <a:rPr lang="en-US" sz="1200" u="sng" dirty="0" smtClean="0">
-                <a:solidFill>
-                  <a:schemeClr val="bg1"/>
-                </a:solidFill>
-              </a:rPr>
-              <a:t>School Year</a:t>
-            </a:r>
-            <a:r>
-              <a:rPr lang="en-US" sz="1200" u="sng" dirty="0" smtClean="0">
-                <a:solidFill>
-                  <a:schemeClr val="bg1"/>
-                </a:solidFill>
-              </a:rPr>
-              <a:t>:</a:t>
-            </a:r>
-            <a:r>
-              <a:rPr lang="en-US" sz="1200" dirty="0" smtClean="0">
-                <a:solidFill>
-                  <a:schemeClr val="bg1"/>
-                </a:solidFill>
-              </a:rPr>
-              <a:t>   100 </a:t>
-            </a:r>
-            <a:r>
-              <a:rPr lang="en-US" sz="1200" dirty="0" smtClean="0">
-                <a:solidFill>
-                  <a:schemeClr val="bg1"/>
-                </a:solidFill>
-              </a:rPr>
-              <a:t>Community</a:t>
-            </a:r>
-            <a:r>
-              <a:rPr lang="en-US" sz="1200" dirty="0" smtClean="0">
-                <a:solidFill>
-                  <a:schemeClr val="bg1"/>
-                </a:solidFill>
-              </a:rPr>
-              <a:t> + Social Investors</a:t>
+              <a:t>   100 Community + Social Investors</a:t>
             </a:r>
             <a:r>
               <a:rPr lang="en-US" sz="1000" dirty="0" smtClean="0">
@@ -3452,7 +3399,15 @@
                   <a:schemeClr val="bg1"/>
                 </a:solidFill>
               </a:rPr>
-              <a:t>How much do we know about “investing”? Apparently, I don’t know enough. From my understanding (and feel free to correct me) if we have 100 investors at $100 per month, then we can support our students with $100,000 and generously improve our national movement with $20,000 annually.</a:t>
+              <a:t>How much do we know about “investing”? Apparently, I don’t know enough. From my understanding (and feel free to correct me) if we have 100 investors at $100 per month, then we can support our students with $100,000 and generously improve our national movement with $20,000 annually</a:t>
+            </a:r>
+            <a:r>
+              <a:rPr lang="en-US" sz="1000" dirty="0" smtClean="0">
+                <a:solidFill>
+                  <a:schemeClr val="bg1"/>
+                </a:solidFill>
+              </a:rPr>
+              <a:t>. This investment provides life skills…because a degree is simply not enough.</a:t>
             </a:r>
             <a:r>
               <a:rPr lang="en-US" sz="1000" dirty="0">
@@ -3561,11 +3516,7 @@
           <a:p>
             <a:r>
               <a:rPr lang="en-US" sz="1600" i="1" dirty="0" smtClean="0"/>
-              <a:t>Oct </a:t>
-            </a:r>
-            <a:r>
-              <a:rPr lang="en-US" sz="1600" i="1" dirty="0" smtClean="0"/>
-              <a:t>2015</a:t>
+              <a:t>Oct 2015</a:t>
             </a:r>
             <a:endParaRPr lang="en-US" sz="1600" i="1" dirty="0"/>
           </a:p>
@@ -3678,7 +3629,15 @@
                   <a:srgbClr val="A50021"/>
                 </a:solidFill>
               </a:rPr>
-              <a:t> </a:t>
+              <a:t> Then He said to them, “Take heed what you hear. With the same measure you use, it will be measured to you; and to you who hear, more will be given. </a:t>
+            </a:r>
+            <a:r>
+              <a:rPr lang="en-US" sz="1200" baseline="30000" dirty="0" smtClean="0">
+                <a:solidFill>
+                  <a:srgbClr val="A50021"/>
+                </a:solidFill>
+              </a:rPr>
+              <a:t>25</a:t>
             </a:r>
             <a:r>
               <a:rPr lang="en-US" sz="1200" dirty="0" smtClean="0">
@@ -3686,55 +3645,15 @@
                   <a:srgbClr val="A50021"/>
                 </a:solidFill>
               </a:rPr>
-              <a:t>Then </a:t>
-            </a:r>
-            <a:r>
-              <a:rPr lang="en-US" sz="1200" dirty="0" smtClean="0">
+              <a:t> For whoever has, to him more will be given; but whoever does not have, even what he has will be taken away from him.”  -  </a:t>
+            </a:r>
+            <a:r>
+              <a:rPr lang="en-US" sz="1200" i="1" dirty="0" smtClean="0">
                 <a:solidFill>
                   <a:srgbClr val="A50021"/>
                 </a:solidFill>
               </a:rPr>
-              <a:t>He said to them, “Take heed what you hear. With the same measure you use, it will be measured to you; and to you who hear, more will be given. </a:t>
-            </a:r>
-            <a:r>
-              <a:rPr lang="en-US" sz="1200" baseline="30000" dirty="0" smtClean="0">
-                <a:solidFill>
-                  <a:srgbClr val="A50021"/>
-                </a:solidFill>
-              </a:rPr>
-              <a:t>25</a:t>
-            </a:r>
-            <a:r>
-              <a:rPr lang="en-US" sz="1200" dirty="0" smtClean="0">
-                <a:solidFill>
-                  <a:srgbClr val="A50021"/>
-                </a:solidFill>
-              </a:rPr>
-              <a:t> For whoever has, to him more will be given; but whoever does not have, even what he has will be taken away from him.”  </a:t>
-            </a:r>
-            <a:r>
-              <a:rPr lang="en-US" sz="1200" dirty="0" smtClean="0">
-                <a:solidFill>
-                  <a:srgbClr val="A50021"/>
-                </a:solidFill>
-              </a:rPr>
-              <a:t>-  </a:t>
-            </a:r>
-            <a:r>
-              <a:rPr lang="en-US" sz="1200" i="1" dirty="0" smtClean="0">
-                <a:solidFill>
-                  <a:srgbClr val="A50021"/>
-                </a:solidFill>
-              </a:rPr>
-              <a:t>Mark 4:24-25 </a:t>
-            </a:r>
-            <a:r>
-              <a:rPr lang="en-US" sz="1200" i="1" dirty="0" smtClean="0">
-                <a:solidFill>
-                  <a:srgbClr val="A50021"/>
-                </a:solidFill>
-              </a:rPr>
-              <a:t>(NKJV)</a:t>
+              <a:t>Mark 4:24-25 (NKJV)</a:t>
             </a:r>
           </a:p>
         </p:txBody>
@@ -3775,15 +3694,53 @@
                   <a:srgbClr val="002060"/>
                 </a:solidFill>
               </a:rPr>
-              <a:t>The 411 – </a:t>
-            </a:r>
-            <a:r>
-              <a:rPr lang="en-US" sz="1200" b="1" i="1" u="sng" dirty="0" smtClean="0">
+              <a:t>The 411 – LOTS of love and support!!!</a:t>
+            </a:r>
+            <a:r>
+              <a:rPr lang="en-US" sz="1200" dirty="0" smtClean="0">
                 <a:solidFill>
                   <a:srgbClr val="002060"/>
                 </a:solidFill>
               </a:rPr>
-              <a:t>LOTS of love and support!!!</a:t>
+              <a:t> </a:t>
+            </a:r>
+          </a:p>
+          <a:p>
+            <a:pPr marL="91440"/>
+            <a:r>
+              <a:rPr lang="en-US" sz="1200" i="1" dirty="0" smtClean="0">
+                <a:solidFill>
+                  <a:srgbClr val="002060"/>
+                </a:solidFill>
+              </a:rPr>
+              <a:t>Typically, I highlight some of our students, but in this newsletter I must highlight our professionals who have been showing crazy love and huge support for our ministry at Howard University with faith that our impact, Lord willing, will go beyond the boundaries of our campus. [Photos on next page] And, </a:t>
+            </a:r>
+            <a:r>
+              <a:rPr lang="en-US" sz="1200" i="1" dirty="0" err="1" smtClean="0">
+                <a:solidFill>
+                  <a:srgbClr val="002060"/>
+                </a:solidFill>
+              </a:rPr>
+              <a:t>yo</a:t>
+            </a:r>
+            <a:r>
+              <a:rPr lang="en-US" sz="1200" i="1" dirty="0" smtClean="0">
+                <a:solidFill>
+                  <a:srgbClr val="002060"/>
+                </a:solidFill>
+              </a:rPr>
+              <a:t>’, I know we don’t expect praise because all glory goes to God, but I’d be foolish not to mention this fortune.</a:t>
+            </a:r>
+          </a:p>
+          <a:p>
+            <a:pPr marL="91440"/>
+            <a:r>
+              <a:rPr lang="en-US" sz="1200" b="1" dirty="0" smtClean="0">
+                <a:solidFill>
+                  <a:srgbClr val="002060"/>
+                </a:solidFill>
+              </a:rPr>
+              <a:t>Chris Coley</a:t>
             </a:r>
             <a:r>
               <a:rPr lang="en-US" sz="1200" dirty="0" smtClean="0">
@@ -3791,7 +3748,263 @@
                   <a:srgbClr val="002060"/>
                 </a:solidFill>
               </a:rPr>
-              <a:t> </a:t>
+              <a:t> has been diligent with being present while contributing to our studies since September 2nd.</a:t>
+            </a:r>
+          </a:p>
+          <a:p>
+            <a:pPr marL="91440"/>
+            <a:r>
+              <a:rPr lang="en-US" sz="1200" b="1" dirty="0" smtClean="0">
+                <a:solidFill>
+                  <a:srgbClr val="002060"/>
+                </a:solidFill>
+              </a:rPr>
+              <a:t>Beverly Davis </a:t>
+            </a:r>
+            <a:r>
+              <a:rPr lang="en-US" sz="1200" dirty="0" smtClean="0">
+                <a:solidFill>
+                  <a:srgbClr val="002060"/>
+                </a:solidFill>
+              </a:rPr>
+              <a:t>is in discipleship with a couple students and has been attending some of our studies as well as our first family night.</a:t>
+            </a:r>
+          </a:p>
+          <a:p>
+            <a:pPr marL="91440"/>
+            <a:r>
+              <a:rPr lang="en-US" sz="1200" b="1" dirty="0" smtClean="0">
+                <a:solidFill>
+                  <a:srgbClr val="002060"/>
+                </a:solidFill>
+              </a:rPr>
+              <a:t>Ashley Holston</a:t>
+            </a:r>
+            <a:r>
+              <a:rPr lang="en-US" sz="1200" dirty="0" smtClean="0">
+                <a:solidFill>
+                  <a:srgbClr val="002060"/>
+                </a:solidFill>
+              </a:rPr>
+              <a:t> is developing our social media communication. Follow us! </a:t>
+            </a:r>
+            <a:r>
+              <a:rPr lang="en-US" sz="1200" dirty="0" smtClean="0">
+                <a:solidFill>
+                  <a:srgbClr val="284AF4"/>
+                </a:solidFill>
+              </a:rPr>
+              <a:t>@impactbison</a:t>
+            </a:r>
+          </a:p>
+          <a:p>
+            <a:pPr marL="91440"/>
+            <a:r>
+              <a:rPr lang="en-US" sz="1200" b="1" dirty="0" smtClean="0">
+                <a:solidFill>
+                  <a:srgbClr val="002060"/>
+                </a:solidFill>
+              </a:rPr>
+              <a:t>Faith Booker</a:t>
+            </a:r>
+            <a:r>
+              <a:rPr lang="en-US" sz="1200" dirty="0" smtClean="0">
+                <a:solidFill>
+                  <a:srgbClr val="002060"/>
+                </a:solidFill>
+              </a:rPr>
+              <a:t> and family are preparing to host our next Impact Family Night/Day.</a:t>
+            </a:r>
+          </a:p>
+          <a:p>
+            <a:pPr marL="91440"/>
+            <a:r>
+              <a:rPr lang="en-US" sz="1200" b="1" dirty="0" err="1" smtClean="0">
+                <a:solidFill>
+                  <a:srgbClr val="002060"/>
+                </a:solidFill>
+              </a:rPr>
+              <a:t>Asa</a:t>
+            </a:r>
+            <a:r>
+              <a:rPr lang="en-US" sz="1200" b="1" dirty="0" smtClean="0">
+                <a:solidFill>
+                  <a:srgbClr val="002060"/>
+                </a:solidFill>
+              </a:rPr>
+              <a:t> Briggs</a:t>
+            </a:r>
+            <a:r>
+              <a:rPr lang="en-US" sz="1200" dirty="0" smtClean="0">
+                <a:solidFill>
+                  <a:srgbClr val="002060"/>
+                </a:solidFill>
+              </a:rPr>
+              <a:t> is preparing to enter discipleship with one of our students and has graciously offered to sponsor a financial education training for our students.</a:t>
+            </a:r>
+          </a:p>
+          <a:p>
+            <a:pPr marL="91440"/>
+            <a:r>
+              <a:rPr lang="en-US" sz="1200" b="1" dirty="0" smtClean="0">
+                <a:solidFill>
+                  <a:srgbClr val="002060"/>
+                </a:solidFill>
+              </a:rPr>
+              <a:t>Brittany Clay</a:t>
+            </a:r>
+            <a:r>
+              <a:rPr lang="en-US" sz="1200" dirty="0" smtClean="0">
+                <a:solidFill>
+                  <a:srgbClr val="002060"/>
+                </a:solidFill>
+              </a:rPr>
+              <a:t> is in discipleship with one of our students and almost won Settlers of </a:t>
+            </a:r>
+            <a:r>
+              <a:rPr lang="en-US" sz="1200" dirty="0" err="1" smtClean="0">
+                <a:solidFill>
+                  <a:srgbClr val="002060"/>
+                </a:solidFill>
+              </a:rPr>
+              <a:t>Catan</a:t>
+            </a:r>
+            <a:r>
+              <a:rPr lang="en-US" sz="1200" dirty="0" smtClean="0">
+                <a:solidFill>
+                  <a:srgbClr val="002060"/>
+                </a:solidFill>
+              </a:rPr>
+              <a:t> (board game) at our first family night.</a:t>
+            </a:r>
+          </a:p>
+          <a:p>
+            <a:pPr marL="91440"/>
+            <a:r>
+              <a:rPr lang="en-US" sz="1200" b="1" dirty="0" smtClean="0">
+                <a:solidFill>
+                  <a:srgbClr val="002060"/>
+                </a:solidFill>
+              </a:rPr>
+              <a:t>Jewell Booker</a:t>
+            </a:r>
+            <a:r>
+              <a:rPr lang="en-US" sz="1200" dirty="0" smtClean="0">
+                <a:solidFill>
+                  <a:srgbClr val="002060"/>
+                </a:solidFill>
+              </a:rPr>
+              <a:t> is taking the lead </a:t>
+            </a:r>
+            <a:r>
+              <a:rPr lang="en-US" sz="1200" dirty="0" smtClean="0">
+                <a:solidFill>
+                  <a:srgbClr val="002060"/>
+                </a:solidFill>
+              </a:rPr>
+              <a:t>on our weekly </a:t>
+            </a:r>
+            <a:r>
+              <a:rPr lang="en-US" sz="1200" dirty="0" smtClean="0">
+                <a:solidFill>
+                  <a:srgbClr val="002060"/>
+                </a:solidFill>
+              </a:rPr>
+              <a:t>family prayers on Thursdays at 9pm. Please pray with us when you can by joining our conference call </a:t>
+            </a:r>
+            <a:r>
+              <a:rPr lang="en-US" sz="1200" b="1" dirty="0" smtClean="0">
+                <a:solidFill>
+                  <a:srgbClr val="002060"/>
+                </a:solidFill>
+              </a:rPr>
+              <a:t>605-475-4333</a:t>
+            </a:r>
+            <a:r>
+              <a:rPr lang="en-US" sz="1200" dirty="0" smtClean="0">
+                <a:solidFill>
+                  <a:srgbClr val="002060"/>
+                </a:solidFill>
+              </a:rPr>
+              <a:t>, code </a:t>
+            </a:r>
+            <a:r>
+              <a:rPr lang="en-US" sz="1200" b="1" dirty="0" smtClean="0">
+                <a:solidFill>
+                  <a:srgbClr val="002060"/>
+                </a:solidFill>
+              </a:rPr>
+              <a:t>440365#</a:t>
+            </a:r>
+            <a:r>
+              <a:rPr lang="en-US" sz="1200" dirty="0" smtClean="0">
+                <a:solidFill>
+                  <a:srgbClr val="002060"/>
+                </a:solidFill>
+              </a:rPr>
+              <a:t>.</a:t>
+            </a:r>
+          </a:p>
+          <a:p>
+            <a:pPr marL="91440"/>
+            <a:r>
+              <a:rPr lang="en-US" sz="1200" b="1" dirty="0" smtClean="0">
+                <a:solidFill>
+                  <a:srgbClr val="002060"/>
+                </a:solidFill>
+              </a:rPr>
+              <a:t>LaToya Archibald </a:t>
+            </a:r>
+            <a:r>
+              <a:rPr lang="en-US" sz="1200" dirty="0" smtClean="0">
+                <a:solidFill>
+                  <a:srgbClr val="002060"/>
+                </a:solidFill>
+              </a:rPr>
+              <a:t>is leading another campus ministry and graciously allowing me to collaborate with her.</a:t>
+            </a:r>
+          </a:p>
+          <a:p>
+            <a:pPr marL="91440"/>
+            <a:r>
+              <a:rPr lang="en-US" sz="1200" b="1" dirty="0" smtClean="0">
+                <a:solidFill>
+                  <a:srgbClr val="002060"/>
+                </a:solidFill>
+              </a:rPr>
+              <a:t>Two “investors”</a:t>
+            </a:r>
+            <a:r>
+              <a:rPr lang="en-US" sz="1200" dirty="0" smtClean="0">
+                <a:solidFill>
+                  <a:srgbClr val="002060"/>
+                </a:solidFill>
+              </a:rPr>
+              <a:t> have blessed us which helps with covering resources that our ministry </a:t>
+            </a:r>
+            <a:r>
+              <a:rPr lang="en-US" sz="1200" dirty="0" smtClean="0">
+                <a:solidFill>
+                  <a:srgbClr val="002060"/>
+                </a:solidFill>
+              </a:rPr>
+              <a:t>provides </a:t>
+            </a:r>
+            <a:r>
+              <a:rPr lang="en-US" sz="1200" dirty="0" smtClean="0">
+                <a:solidFill>
+                  <a:srgbClr val="002060"/>
+                </a:solidFill>
+              </a:rPr>
+              <a:t>to our younger brothers and sisters (i.e. students) including scholarships to the Impact Fall Retreat and purchasing books like Kingdom Man/Woman</a:t>
+            </a:r>
+            <a:r>
+              <a:rPr lang="en-US" sz="1200" dirty="0" smtClean="0">
+                <a:solidFill>
+                  <a:srgbClr val="002060"/>
+                </a:solidFill>
+              </a:rPr>
+              <a:t>.</a:t>
             </a:r>
             <a:endParaRPr lang="en-US" sz="1200" dirty="0" smtClean="0">
               <a:solidFill>
@@ -3799,304 +4012,6 @@
               </a:solidFill>
             </a:endParaRPr>
           </a:p>
-          <a:p>
-            <a:pPr marL="91440"/>
-            <a:r>
-              <a:rPr lang="en-US" sz="1200" i="1" dirty="0" smtClean="0">
-                <a:solidFill>
-                  <a:srgbClr val="002060"/>
-                </a:solidFill>
-              </a:rPr>
-              <a:t>Typically, I highlight some of our students, but in this newsletter I must highlight our professionals who have been showing crazy love and huge support for our ministry at Howard University with faith that our impact, Lord willing, will go beyond the boundaries of our campus. [Photos on next page] And, </a:t>
-            </a:r>
-            <a:r>
-              <a:rPr lang="en-US" sz="1200" i="1" dirty="0" err="1" smtClean="0">
-                <a:solidFill>
-                  <a:srgbClr val="002060"/>
-                </a:solidFill>
-              </a:rPr>
-              <a:t>yo</a:t>
-            </a:r>
-            <a:r>
-              <a:rPr lang="en-US" sz="1200" i="1" dirty="0" smtClean="0">
-                <a:solidFill>
-                  <a:srgbClr val="002060"/>
-                </a:solidFill>
-              </a:rPr>
-              <a:t>’, I know we don’t expec</a:t>
-            </a:r>
-            <a:r>
-              <a:rPr lang="en-US" sz="1200" i="1" dirty="0" smtClean="0">
-                <a:solidFill>
-                  <a:srgbClr val="002060"/>
-                </a:solidFill>
-              </a:rPr>
-              <a:t>t praise because all glory goes to God, but I’d be foolish not to mention this fortune.</a:t>
-            </a:r>
-            <a:endParaRPr lang="en-US" sz="1200" i="1" dirty="0" smtClean="0">
-              <a:solidFill>
-                <a:srgbClr val="002060"/>
-              </a:solidFill>
-            </a:endParaRPr>
-          </a:p>
-          <a:p>
-            <a:pPr marL="91440"/>
-            <a:r>
-              <a:rPr lang="en-US" sz="1200" b="1" dirty="0" smtClean="0">
-                <a:solidFill>
-                  <a:srgbClr val="002060"/>
-                </a:solidFill>
-              </a:rPr>
-              <a:t>Chris Coley</a:t>
-            </a:r>
-            <a:r>
-              <a:rPr lang="en-US" sz="1200" dirty="0" smtClean="0">
-                <a:solidFill>
-                  <a:srgbClr val="002060"/>
-                </a:solidFill>
-              </a:rPr>
-              <a:t> </a:t>
-            </a:r>
-            <a:r>
-              <a:rPr lang="en-US" sz="1200" dirty="0" smtClean="0">
-                <a:solidFill>
-                  <a:srgbClr val="002060"/>
-                </a:solidFill>
-              </a:rPr>
-              <a:t>has been diligent with being present while contributing to our studies since September 2nd.</a:t>
-            </a:r>
-            <a:endParaRPr lang="en-US" sz="1200" dirty="0" smtClean="0">
-              <a:solidFill>
-                <a:srgbClr val="002060"/>
-              </a:solidFill>
-            </a:endParaRPr>
-          </a:p>
-          <a:p>
-            <a:pPr marL="91440"/>
-            <a:r>
-              <a:rPr lang="en-US" sz="1200" b="1" dirty="0" smtClean="0">
-                <a:solidFill>
-                  <a:srgbClr val="002060"/>
-                </a:solidFill>
-              </a:rPr>
-              <a:t>Beverly Davis </a:t>
-            </a:r>
-            <a:r>
-              <a:rPr lang="en-US" sz="1200" dirty="0" smtClean="0">
-                <a:solidFill>
-                  <a:srgbClr val="002060"/>
-                </a:solidFill>
-              </a:rPr>
-              <a:t>is in discipleship with a couple students and has been attending some of our studies as well as our first family night.</a:t>
-            </a:r>
-            <a:endParaRPr lang="en-US" sz="1200" dirty="0" smtClean="0">
-              <a:solidFill>
-                <a:srgbClr val="002060"/>
-              </a:solidFill>
-            </a:endParaRPr>
-          </a:p>
-          <a:p>
-            <a:pPr marL="91440"/>
-            <a:r>
-              <a:rPr lang="en-US" sz="1200" b="1" dirty="0" smtClean="0">
-                <a:solidFill>
-                  <a:srgbClr val="002060"/>
-                </a:solidFill>
-              </a:rPr>
-              <a:t>Ashley Holston</a:t>
-            </a:r>
-            <a:r>
-              <a:rPr lang="en-US" sz="1200" dirty="0" smtClean="0">
-                <a:solidFill>
-                  <a:srgbClr val="002060"/>
-                </a:solidFill>
-              </a:rPr>
-              <a:t> is developing our social media communication. Follow us! </a:t>
-            </a:r>
-            <a:r>
-              <a:rPr lang="en-US" sz="1200" dirty="0" smtClean="0">
-                <a:solidFill>
-                  <a:srgbClr val="284AF4"/>
-                </a:solidFill>
-              </a:rPr>
-              <a:t>@impactbison</a:t>
-            </a:r>
-            <a:endParaRPr lang="en-US" sz="1200" dirty="0" smtClean="0">
-              <a:solidFill>
-                <a:srgbClr val="284AF4"/>
-              </a:solidFill>
-            </a:endParaRPr>
-          </a:p>
-          <a:p>
-            <a:pPr marL="91440"/>
-            <a:r>
-              <a:rPr lang="en-US" sz="1200" b="1" dirty="0" smtClean="0">
-                <a:solidFill>
-                  <a:srgbClr val="002060"/>
-                </a:solidFill>
-              </a:rPr>
-              <a:t>Faith Booker</a:t>
-            </a:r>
-            <a:r>
-              <a:rPr lang="en-US" sz="1200" dirty="0" smtClean="0">
-                <a:solidFill>
-                  <a:srgbClr val="002060"/>
-                </a:solidFill>
-              </a:rPr>
-              <a:t> and family are preparing to host our next Impact Family Night/Day.</a:t>
-            </a:r>
-          </a:p>
-          <a:p>
-            <a:pPr marL="91440"/>
-            <a:r>
-              <a:rPr lang="en-US" sz="1200" b="1" dirty="0" err="1" smtClean="0">
-                <a:solidFill>
-                  <a:srgbClr val="002060"/>
-                </a:solidFill>
-              </a:rPr>
-              <a:t>Asa</a:t>
-            </a:r>
-            <a:r>
-              <a:rPr lang="en-US" sz="1200" b="1" dirty="0" smtClean="0">
-                <a:solidFill>
-                  <a:srgbClr val="002060"/>
-                </a:solidFill>
-              </a:rPr>
-              <a:t> Briggs</a:t>
-            </a:r>
-            <a:r>
-              <a:rPr lang="en-US" sz="1200" dirty="0" smtClean="0">
-                <a:solidFill>
-                  <a:srgbClr val="002060"/>
-                </a:solidFill>
-              </a:rPr>
-              <a:t> is preparing to enter discipleship with one of our students and has graciously offered to sponsor a financial education training for our students.</a:t>
-            </a:r>
-          </a:p>
-          <a:p>
-            <a:pPr marL="91440"/>
-            <a:r>
-              <a:rPr lang="en-US" sz="1200" b="1" dirty="0" smtClean="0">
-                <a:solidFill>
-                  <a:srgbClr val="002060"/>
-                </a:solidFill>
-              </a:rPr>
-              <a:t>Brittany Clay</a:t>
-            </a:r>
-            <a:r>
-              <a:rPr lang="en-US" sz="1200" dirty="0" smtClean="0">
-                <a:solidFill>
-                  <a:srgbClr val="002060"/>
-                </a:solidFill>
-              </a:rPr>
-              <a:t> is in discipleship with one of our students and almost won Settlers of </a:t>
-            </a:r>
-            <a:r>
-              <a:rPr lang="en-US" sz="1200" dirty="0" err="1" smtClean="0">
-                <a:solidFill>
-                  <a:srgbClr val="002060"/>
-                </a:solidFill>
-              </a:rPr>
-              <a:t>Catan</a:t>
-            </a:r>
-            <a:r>
-              <a:rPr lang="en-US" sz="1200" dirty="0" smtClean="0">
-                <a:solidFill>
-                  <a:srgbClr val="002060"/>
-                </a:solidFill>
-              </a:rPr>
-              <a:t> (board game) at our first family night.</a:t>
-            </a:r>
-          </a:p>
-          <a:p>
-            <a:pPr marL="91440"/>
-            <a:r>
-              <a:rPr lang="en-US" sz="1200" b="1" dirty="0" smtClean="0">
-                <a:solidFill>
-                  <a:srgbClr val="002060"/>
-                </a:solidFill>
-              </a:rPr>
-              <a:t>Jewell Booker</a:t>
-            </a:r>
-            <a:r>
-              <a:rPr lang="en-US" sz="1200" dirty="0" smtClean="0">
-                <a:solidFill>
-                  <a:srgbClr val="002060"/>
-                </a:solidFill>
-              </a:rPr>
-              <a:t> is taking the lead our on weekly family prayers on Thursdays at 9pm. Please pray with us when you can by joining our conference call </a:t>
-            </a:r>
-            <a:r>
-              <a:rPr lang="en-US" sz="1200" b="1" dirty="0" smtClean="0">
-                <a:solidFill>
-                  <a:srgbClr val="002060"/>
-                </a:solidFill>
-              </a:rPr>
-              <a:t>605-475-4333</a:t>
-            </a:r>
-            <a:r>
-              <a:rPr lang="en-US" sz="1200" dirty="0" smtClean="0">
-                <a:solidFill>
-                  <a:srgbClr val="002060"/>
-                </a:solidFill>
-              </a:rPr>
-              <a:t>, code </a:t>
-            </a:r>
-            <a:r>
-              <a:rPr lang="en-US" sz="1200" b="1" dirty="0" smtClean="0">
-                <a:solidFill>
-                  <a:srgbClr val="002060"/>
-                </a:solidFill>
-              </a:rPr>
-              <a:t>440365#</a:t>
-            </a:r>
-            <a:r>
-              <a:rPr lang="en-US" sz="1200" dirty="0" smtClean="0">
-                <a:solidFill>
-                  <a:srgbClr val="002060"/>
-                </a:solidFill>
-              </a:rPr>
-              <a:t>.</a:t>
-            </a:r>
-          </a:p>
-          <a:p>
-            <a:pPr marL="91440"/>
-            <a:r>
-              <a:rPr lang="en-US" sz="1200" b="1" dirty="0" smtClean="0">
-                <a:solidFill>
-                  <a:srgbClr val="002060"/>
-                </a:solidFill>
-              </a:rPr>
-              <a:t>LaToya Archibald </a:t>
-            </a:r>
-            <a:r>
-              <a:rPr lang="en-US" sz="1200" dirty="0" smtClean="0">
-                <a:solidFill>
-                  <a:srgbClr val="002060"/>
-                </a:solidFill>
-              </a:rPr>
-              <a:t>is leading another campus ministry and graciously allowing me to collaborate with her.</a:t>
-            </a:r>
-          </a:p>
-          <a:p>
-            <a:pPr marL="91440"/>
-            <a:r>
-              <a:rPr lang="en-US" sz="1200" b="1" dirty="0" smtClean="0">
-                <a:solidFill>
-                  <a:srgbClr val="002060"/>
-                </a:solidFill>
-              </a:rPr>
-              <a:t>Two “investors”</a:t>
-            </a:r>
-            <a:r>
-              <a:rPr lang="en-US" sz="1200" dirty="0" smtClean="0">
-                <a:solidFill>
-                  <a:srgbClr val="002060"/>
-                </a:solidFill>
-              </a:rPr>
-              <a:t> have blessed us which helps with covering resources that our ministry will provide to our younger brothers and sisters (i.e. students) including scholarships to the Impact Fall Retreat and purchasing books like Kingdom Man/Woman.</a:t>
-            </a:r>
-          </a:p>
         </p:txBody>
       </p:sp>
       <p:sp>
@@ -4166,15 +4081,7 @@
             <a:pPr algn="ctr"/>
             <a:r>
               <a:rPr lang="en-US" sz="800" dirty="0" smtClean="0"/>
-              <a:t>Impact </a:t>
-            </a:r>
-            <a:r>
-              <a:rPr lang="en-US" sz="800" dirty="0" smtClean="0"/>
-              <a:t>Professional </a:t>
-            </a:r>
-            <a:r>
-              <a:rPr lang="en-US" sz="800" dirty="0" smtClean="0"/>
-              <a:t>“Gordon”</a:t>
+              <a:t>Impact Professional “Gordon”</a:t>
             </a:r>
             <a:endParaRPr lang="en-US" sz="800" dirty="0"/>
           </a:p>
@@ -4436,7 +4343,7 @@
         </p:nvSpPr>
         <p:spPr>
           <a:xfrm>
-            <a:off x="76200" y="8229600"/>
+            <a:off x="76200" y="8606135"/>
             <a:ext cx="6705600" cy="461665"/>
           </a:xfrm>
           <a:prstGeom prst="rect">
@@ -4622,11 +4529,7 @@
           <a:p>
             <a:r>
               <a:rPr lang="en-US" sz="1600" i="1" dirty="0" smtClean="0"/>
-              <a:t>Oct </a:t>
-            </a:r>
-            <a:r>
-              <a:rPr lang="en-US" sz="1600" i="1" dirty="0" smtClean="0"/>
-              <a:t>2015</a:t>
+              <a:t>Oct 2015</a:t>
             </a:r>
             <a:endParaRPr lang="en-US" sz="1600" i="1" dirty="0"/>
           </a:p>
@@ -4634,7 +4537,7 @@
       </p:sp>
       <p:pic>
         <p:nvPicPr>
-          <p:cNvPr id="13" name="Picture 12"/>
+          <p:cNvPr id="9" name="Picture 8"/>
           <p:cNvPicPr>
             <a:picLocks noChangeAspect="1"/>
           </p:cNvPicPr>
@@ -4654,29 +4557,96 @@
         </p:blipFill>
         <p:spPr>
           <a:xfrm>
-            <a:off x="125472" y="1219200"/>
-            <a:ext cx="941328" cy="1673472"/>
+            <a:off x="2362200" y="76200"/>
+            <a:ext cx="2788920" cy="708067"/>
           </a:xfrm>
           <a:prstGeom prst="rect">
             <a:avLst/>
           </a:prstGeom>
-          <a:ln w="50800">
-            <a:solidFill>
-              <a:schemeClr val="tx2"/>
-            </a:solidFill>
-          </a:ln>
         </p:spPr>
       </p:pic>
+      <p:sp>
+        <p:nvSpPr>
+          <p:cNvPr id="4" name="TextBox 3"/>
+          <p:cNvSpPr txBox="1"/>
+          <p:nvPr/>
+        </p:nvSpPr>
+        <p:spPr>
+          <a:xfrm>
+            <a:off x="108585" y="838200"/>
+            <a:ext cx="1872615" cy="261610"/>
+          </a:xfrm>
+          <a:prstGeom prst="rect">
+            <a:avLst/>
+          </a:prstGeom>
+          <a:noFill/>
+        </p:spPr>
+        <p:txBody>
+          <a:bodyPr wrap="square" rtlCol="0">
+            <a:spAutoFit/>
+          </a:bodyPr>
+          <a:lstStyle/>
+          <a:p>
+            <a:r>
+              <a:rPr lang="en-US" sz="1100" dirty="0">
+                <a:hlinkClick r:id="rId5"/>
+              </a:rPr>
+              <a:t>http://impactmovement.org</a:t>
+            </a:r>
+            <a:r>
+              <a:rPr lang="en-US" sz="1100" dirty="0" smtClean="0">
+                <a:hlinkClick r:id="rId5"/>
+              </a:rPr>
+              <a:t>/</a:t>
+            </a:r>
+            <a:r>
+              <a:rPr lang="en-US" sz="1100" dirty="0" smtClean="0"/>
+              <a:t> </a:t>
+            </a:r>
+            <a:endParaRPr lang="en-US" sz="1100" dirty="0"/>
+          </a:p>
+        </p:txBody>
+      </p:sp>
+      <p:sp>
+        <p:nvSpPr>
+          <p:cNvPr id="10" name="TextBox 9"/>
+          <p:cNvSpPr txBox="1"/>
+          <p:nvPr/>
+        </p:nvSpPr>
+        <p:spPr>
+          <a:xfrm>
+            <a:off x="152400" y="3276600"/>
+            <a:ext cx="2479541" cy="338554"/>
+          </a:xfrm>
+          <a:prstGeom prst="rect">
+            <a:avLst/>
+          </a:prstGeom>
+          <a:noFill/>
+        </p:spPr>
+        <p:txBody>
+          <a:bodyPr wrap="square" rtlCol="0">
+            <a:spAutoFit/>
+          </a:bodyPr>
+          <a:lstStyle/>
+          <a:p>
+            <a:r>
+              <a:rPr lang="en-US" sz="800" dirty="0" smtClean="0"/>
+              <a:t>Top photos: President Jimmy McGee discussing the history, present, and future of the Impact Movement.</a:t>
+            </a:r>
+            <a:endParaRPr lang="en-US" sz="800" dirty="0"/>
+          </a:p>
+        </p:txBody>
+      </p:sp>
       <p:pic>
         <p:nvPicPr>
-          <p:cNvPr id="9" name="Picture 8"/>
+          <p:cNvPr id="11" name="Picture 10"/>
           <p:cNvPicPr>
             <a:picLocks noChangeAspect="1"/>
           </p:cNvPicPr>
           <p:nvPr/>
         </p:nvPicPr>
         <p:blipFill>
-          <a:blip r:embed="rId5" cstate="print">
+          <a:blip r:embed="rId6" cstate="print">
             <a:extLst>
               <a:ext uri="{28A0092B-C50C-407E-A947-70E740481C1C}">
                 <a14:useLocalDpi xmlns:a14="http://schemas.microsoft.com/office/drawing/2010/main" val="0"/>
@@ -4689,8 +4659,8 @@
         </p:blipFill>
         <p:spPr>
           <a:xfrm>
-            <a:off x="2362200" y="76200"/>
-            <a:ext cx="2788920" cy="708067"/>
+            <a:off x="2043545" y="879013"/>
+            <a:ext cx="152400" cy="152400"/>
           </a:xfrm>
           <a:prstGeom prst="rect">
             <a:avLst/>
@@ -4699,14 +4669,14 @@
       </p:pic>
       <p:sp>
         <p:nvSpPr>
-          <p:cNvPr id="4" name="TextBox 3"/>
+          <p:cNvPr id="22" name="TextBox 21"/>
           <p:cNvSpPr txBox="1"/>
           <p:nvPr/>
         </p:nvSpPr>
         <p:spPr>
           <a:xfrm>
-            <a:off x="108585" y="838200"/>
-            <a:ext cx="1872615" cy="261610"/>
+            <a:off x="2242185" y="838200"/>
+            <a:ext cx="3472815" cy="261610"/>
           </a:xfrm>
           <a:prstGeom prst="rect">
             <a:avLst/>
@@ -4721,73 +4691,34 @@
           <a:p>
             <a:r>
               <a:rPr lang="en-US" sz="1100" dirty="0">
-                <a:hlinkClick r:id="rId6"/>
-              </a:rPr>
-              <a:t>http://impactmovement.org</a:t>
+                <a:hlinkClick r:id="rId7"/>
+              </a:rPr>
+              <a:t>https://www.facebook.com/groups/135299829873546</a:t>
             </a:r>
             <a:r>
               <a:rPr lang="en-US" sz="1100" dirty="0" smtClean="0">
-                <a:hlinkClick r:id="rId6"/>
+                <a:hlinkClick r:id="rId7"/>
               </a:rPr>
               <a:t>/</a:t>
             </a:r>
             <a:r>
               <a:rPr lang="en-US" sz="1100" dirty="0" smtClean="0"/>
-              <a:t> </a:t>
+              <a:t>  </a:t>
             </a:r>
             <a:endParaRPr lang="en-US" sz="1100" dirty="0"/>
-          </a:p>
-        </p:txBody>
-      </p:sp>
-      <p:sp>
-        <p:nvSpPr>
-          <p:cNvPr id="10" name="TextBox 9"/>
-          <p:cNvSpPr txBox="1"/>
-          <p:nvPr/>
-        </p:nvSpPr>
-        <p:spPr>
-          <a:xfrm>
-            <a:off x="0" y="2895600"/>
-            <a:ext cx="1143000" cy="338554"/>
-          </a:xfrm>
-          <a:prstGeom prst="rect">
-            <a:avLst/>
-          </a:prstGeom>
-          <a:noFill/>
-        </p:spPr>
-        <p:txBody>
-          <a:bodyPr wrap="square" rtlCol="0">
-            <a:spAutoFit/>
-          </a:bodyPr>
-          <a:lstStyle/>
-          <a:p>
-            <a:pPr algn="ctr"/>
-            <a:r>
-              <a:rPr lang="en-US" sz="800" dirty="0" smtClean="0"/>
-              <a:t>Impact </a:t>
-            </a:r>
-            <a:r>
-              <a:rPr lang="en-US" sz="800" dirty="0" smtClean="0"/>
-              <a:t>Professional </a:t>
-            </a:r>
-            <a:r>
-              <a:rPr lang="en-US" sz="800" dirty="0" smtClean="0"/>
-              <a:t>“Gordon”</a:t>
-            </a:r>
-            <a:endParaRPr lang="en-US" sz="800" dirty="0"/>
           </a:p>
         </p:txBody>
       </p:sp>
       <p:pic>
         <p:nvPicPr>
-          <p:cNvPr id="11" name="Picture 10"/>
+          <p:cNvPr id="6" name="Picture 5"/>
           <p:cNvPicPr>
             <a:picLocks noChangeAspect="1"/>
           </p:cNvPicPr>
           <p:nvPr/>
         </p:nvPicPr>
         <p:blipFill>
-          <a:blip r:embed="rId7" cstate="print">
+          <a:blip r:embed="rId8" cstate="print">
             <a:extLst>
               <a:ext uri="{28A0092B-C50C-407E-A947-70E740481C1C}">
                 <a14:useLocalDpi xmlns:a14="http://schemas.microsoft.com/office/drawing/2010/main" val="0"/>
@@ -4800,24 +4731,177 @@
         </p:blipFill>
         <p:spPr>
           <a:xfrm>
-            <a:off x="2043545" y="879013"/>
-            <a:ext cx="152400" cy="152400"/>
+            <a:off x="3505200" y="1219199"/>
+            <a:ext cx="3276600" cy="1843088"/>
           </a:xfrm>
           <a:prstGeom prst="rect">
             <a:avLst/>
           </a:prstGeom>
         </p:spPr>
       </p:pic>
-      <p:sp>
-        <p:nvSpPr>
-          <p:cNvPr id="22" name="TextBox 21"/>
+      <p:pic>
+        <p:nvPicPr>
+          <p:cNvPr id="12" name="Picture 11"/>
+          <p:cNvPicPr>
+            <a:picLocks noChangeAspect="1"/>
+          </p:cNvPicPr>
+          <p:nvPr/>
+        </p:nvPicPr>
+        <p:blipFill>
+          <a:blip r:embed="rId9" cstate="print">
+            <a:extLst>
+              <a:ext uri="{28A0092B-C50C-407E-A947-70E740481C1C}">
+                <a14:useLocalDpi xmlns:a14="http://schemas.microsoft.com/office/drawing/2010/main" val="0"/>
+              </a:ext>
+            </a:extLst>
+          </a:blip>
+          <a:stretch>
+            <a:fillRect/>
+          </a:stretch>
+        </p:blipFill>
+        <p:spPr>
+          <a:xfrm>
+            <a:off x="76198" y="1219199"/>
+            <a:ext cx="3276602" cy="1843088"/>
+          </a:xfrm>
+          <a:prstGeom prst="rect">
+            <a:avLst/>
+          </a:prstGeom>
+        </p:spPr>
+      </p:pic>
+      <p:pic>
+        <p:nvPicPr>
+          <p:cNvPr id="14" name="Picture 13"/>
+          <p:cNvPicPr>
+            <a:picLocks noChangeAspect="1"/>
+          </p:cNvPicPr>
+          <p:nvPr/>
+        </p:nvPicPr>
+        <p:blipFill>
+          <a:blip r:embed="rId10" cstate="print">
+            <a:extLst>
+              <a:ext uri="{28A0092B-C50C-407E-A947-70E740481C1C}">
+                <a14:useLocalDpi xmlns:a14="http://schemas.microsoft.com/office/drawing/2010/main" val="0"/>
+              </a:ext>
+            </a:extLst>
+          </a:blip>
+          <a:stretch>
+            <a:fillRect/>
+          </a:stretch>
+        </p:blipFill>
+        <p:spPr>
+          <a:xfrm>
+            <a:off x="4876801" y="3352800"/>
+            <a:ext cx="1905000" cy="2001631"/>
+          </a:xfrm>
+          <a:prstGeom prst="rect">
+            <a:avLst/>
+          </a:prstGeom>
+          <a:ln w="63500">
+            <a:noFill/>
+          </a:ln>
+        </p:spPr>
+      </p:pic>
+      <p:pic>
+        <p:nvPicPr>
+          <p:cNvPr id="20" name="Picture 19"/>
+          <p:cNvPicPr>
+            <a:picLocks noChangeAspect="1"/>
+          </p:cNvPicPr>
+          <p:nvPr/>
+        </p:nvPicPr>
+        <p:blipFill>
+          <a:blip r:embed="rId11" cstate="print">
+            <a:extLst>
+              <a:ext uri="{28A0092B-C50C-407E-A947-70E740481C1C}">
+                <a14:useLocalDpi xmlns:a14="http://schemas.microsoft.com/office/drawing/2010/main" val="0"/>
+              </a:ext>
+            </a:extLst>
+          </a:blip>
+          <a:stretch>
+            <a:fillRect/>
+          </a:stretch>
+        </p:blipFill>
+        <p:spPr>
+          <a:xfrm>
+            <a:off x="228600" y="4906933"/>
+            <a:ext cx="2403341" cy="1417667"/>
+          </a:xfrm>
+          <a:prstGeom prst="rect">
+            <a:avLst/>
+          </a:prstGeom>
+        </p:spPr>
+      </p:pic>
+      <p:pic>
+        <p:nvPicPr>
+          <p:cNvPr id="23" name="Picture 22"/>
+          <p:cNvPicPr>
+            <a:picLocks noChangeAspect="1"/>
+          </p:cNvPicPr>
+          <p:nvPr/>
+        </p:nvPicPr>
+        <p:blipFill>
+          <a:blip r:embed="rId12" cstate="print">
+            <a:extLst>
+              <a:ext uri="{28A0092B-C50C-407E-A947-70E740481C1C}">
+                <a14:useLocalDpi xmlns:a14="http://schemas.microsoft.com/office/drawing/2010/main" val="0"/>
+              </a:ext>
+            </a:extLst>
+          </a:blip>
+          <a:stretch>
+            <a:fillRect/>
+          </a:stretch>
+        </p:blipFill>
+        <p:spPr>
+          <a:xfrm>
+            <a:off x="2781166" y="3326631"/>
+            <a:ext cx="1943234" cy="3000581"/>
+          </a:xfrm>
+          <a:prstGeom prst="rect">
+            <a:avLst/>
+          </a:prstGeom>
+        </p:spPr>
+      </p:pic>
+      <p:pic>
+        <p:nvPicPr>
+          <p:cNvPr id="24" name="Picture 23"/>
+          <p:cNvPicPr>
+            <a:picLocks noChangeAspect="1"/>
+          </p:cNvPicPr>
+          <p:nvPr/>
+        </p:nvPicPr>
+        <p:blipFill>
+          <a:blip r:embed="rId13" cstate="print">
+            <a:extLst>
+              <a:ext uri="{28A0092B-C50C-407E-A947-70E740481C1C}">
+                <a14:useLocalDpi xmlns:a14="http://schemas.microsoft.com/office/drawing/2010/main" val="0"/>
+              </a:ext>
+            </a:extLst>
+          </a:blip>
+          <a:stretch>
+            <a:fillRect/>
+          </a:stretch>
+        </p:blipFill>
+        <p:spPr>
+          <a:xfrm>
+            <a:off x="381000" y="6858000"/>
+            <a:ext cx="6161966" cy="1600200"/>
+          </a:xfrm>
+          <a:prstGeom prst="rect">
+            <a:avLst/>
+          </a:prstGeom>
+        </p:spPr>
+      </p:pic>
+      <p:sp>
+        <p:nvSpPr>
+          <p:cNvPr id="25" name="TextBox 24"/>
           <p:cNvSpPr txBox="1"/>
           <p:nvPr/>
         </p:nvSpPr>
         <p:spPr>
           <a:xfrm>
-            <a:off x="2242185" y="838200"/>
-            <a:ext cx="3472815" cy="261610"/>
+            <a:off x="152400" y="3657600"/>
+            <a:ext cx="2479541" cy="461665"/>
           </a:xfrm>
           <a:prstGeom prst="rect">
             <a:avLst/>
@@ -4831,22 +4915,148 @@
           <a:lstStyle/>
           <a:p>
             <a:r>
-              <a:rPr lang="en-US" sz="1100" dirty="0">
-                <a:hlinkClick r:id="rId8"/>
-              </a:rPr>
-              <a:t>https://www.facebook.com/groups/135299829873546</a:t>
-            </a:r>
-            <a:r>
-              <a:rPr lang="en-US" sz="1100" dirty="0" smtClean="0">
-                <a:hlinkClick r:id="rId8"/>
-              </a:rPr>
-              <a:t>/</a:t>
-            </a:r>
-            <a:r>
-              <a:rPr lang="en-US" sz="1100" dirty="0" smtClean="0"/>
-              <a:t>  </a:t>
-            </a:r>
-            <a:endParaRPr lang="en-US" sz="1100" dirty="0"/>
+              <a:rPr lang="en-US" sz="800" dirty="0" smtClean="0"/>
+              <a:t>Center </a:t>
+            </a:r>
+            <a:r>
+              <a:rPr lang="en-US" sz="800" dirty="0" smtClean="0"/>
+              <a:t>photo: Ty, a first year Law student, and me. Ty gives advice to any of our undergraduates interested in Law School. Thankful for his heart and leadership.</a:t>
+            </a:r>
+            <a:endParaRPr lang="en-US" sz="800" dirty="0"/>
+          </a:p>
+        </p:txBody>
+      </p:sp>
+      <p:sp>
+        <p:nvSpPr>
+          <p:cNvPr id="26" name="TextBox 25"/>
+          <p:cNvSpPr txBox="1"/>
+          <p:nvPr/>
+        </p:nvSpPr>
+        <p:spPr>
+          <a:xfrm>
+            <a:off x="152400" y="4186535"/>
+            <a:ext cx="2479541" cy="584775"/>
+          </a:xfrm>
+          <a:prstGeom prst="rect">
+            <a:avLst/>
+          </a:prstGeom>
+          <a:noFill/>
+        </p:spPr>
+        <p:txBody>
+          <a:bodyPr wrap="square" rtlCol="0">
+            <a:spAutoFit/>
+          </a:bodyPr>
+          <a:lstStyle/>
+          <a:p>
+            <a:r>
+              <a:rPr lang="en-US" sz="800" dirty="0" smtClean="0"/>
+              <a:t>Left </a:t>
+            </a:r>
+            <a:r>
+              <a:rPr lang="en-US" sz="800" dirty="0" smtClean="0"/>
+              <a:t>photo: </a:t>
+            </a:r>
+            <a:r>
+              <a:rPr lang="en-US" sz="800" dirty="0" smtClean="0"/>
+              <a:t>Rev. Eugene Burrell, a legend in campus ministry at Howard, graciously taking me under his wings and teaching me how to minister well at Howard University.</a:t>
+            </a:r>
+            <a:endParaRPr lang="en-US" sz="800" dirty="0"/>
+          </a:p>
+        </p:txBody>
+      </p:sp>
+      <p:sp>
+        <p:nvSpPr>
+          <p:cNvPr id="27" name="TextBox 26"/>
+          <p:cNvSpPr txBox="1"/>
+          <p:nvPr/>
+        </p:nvSpPr>
+        <p:spPr>
+          <a:xfrm>
+            <a:off x="4800600" y="5505271"/>
+            <a:ext cx="1793741" cy="1200329"/>
+          </a:xfrm>
+          <a:prstGeom prst="rect">
+            <a:avLst/>
+          </a:prstGeom>
+          <a:noFill/>
+        </p:spPr>
+        <p:txBody>
+          <a:bodyPr wrap="square" rtlCol="0">
+            <a:spAutoFit/>
+          </a:bodyPr>
+          <a:lstStyle/>
+          <a:p>
+            <a:r>
+              <a:rPr lang="en-US" sz="800" dirty="0" smtClean="0"/>
+              <a:t>Right </a:t>
+            </a:r>
+            <a:r>
+              <a:rPr lang="en-US" sz="800" dirty="0" smtClean="0"/>
+              <a:t>photo: A long lost sister and brother of mine, Brittany and </a:t>
+            </a:r>
+            <a:r>
+              <a:rPr lang="en-US" sz="800" dirty="0" err="1" smtClean="0"/>
+              <a:t>Asa</a:t>
+            </a:r>
+            <a:r>
+              <a:rPr lang="en-US" sz="800" dirty="0" smtClean="0"/>
+              <a:t>, have been a wonderful </a:t>
+            </a:r>
+            <a:r>
+              <a:rPr lang="en-US" sz="800" dirty="0" smtClean="0"/>
+              <a:t>blessing in helping all of us with </a:t>
+            </a:r>
+            <a:r>
+              <a:rPr lang="en-US" sz="800" dirty="0" err="1" smtClean="0"/>
+              <a:t>rebuidling</a:t>
+            </a:r>
+            <a:r>
+              <a:rPr lang="en-US" sz="800" dirty="0" smtClean="0"/>
+              <a:t> the Impact campus ministry at Howard University. Like many professionals, they too are super busy but make the time to invest in our younger brothers and sisters (i.e. our students).</a:t>
+            </a:r>
+            <a:endParaRPr lang="en-US" sz="800" dirty="0"/>
+          </a:p>
+        </p:txBody>
+      </p:sp>
+      <p:sp>
+        <p:nvSpPr>
+          <p:cNvPr id="28" name="TextBox 27"/>
+          <p:cNvSpPr txBox="1"/>
+          <p:nvPr/>
+        </p:nvSpPr>
+        <p:spPr>
+          <a:xfrm>
+            <a:off x="339859" y="6443246"/>
+            <a:ext cx="4308341" cy="338554"/>
+          </a:xfrm>
+          <a:prstGeom prst="rect">
+            <a:avLst/>
+          </a:prstGeom>
+          <a:noFill/>
+        </p:spPr>
+        <p:txBody>
+          <a:bodyPr wrap="square" rtlCol="0">
+            <a:spAutoFit/>
+          </a:bodyPr>
+          <a:lstStyle/>
+          <a:p>
+            <a:r>
+              <a:rPr lang="en-US" sz="800" dirty="0" smtClean="0"/>
+              <a:t>Bottom </a:t>
+            </a:r>
+            <a:r>
+              <a:rPr lang="en-US" sz="800" dirty="0" smtClean="0"/>
+              <a:t>photo: We are fans of our brother Jacob, player wearing #46, </a:t>
+            </a:r>
+            <a:r>
+              <a:rPr lang="en-US" sz="800" dirty="0" smtClean="0"/>
+              <a:t>who is a safety for Howard’s football team and reminds us to be safeties for the Gospel. #</a:t>
+            </a:r>
+            <a:r>
+              <a:rPr lang="en-US" sz="800" dirty="0" err="1" smtClean="0"/>
+              <a:t>unashamedGospel</a:t>
+            </a:r>
+            <a:endParaRPr lang="en-US" sz="800" dirty="0"/>
           </a:p>
         </p:txBody>
       </p:sp>

</xml_diff>